<commit_message>
Updated to latest for UDOT release
</commit_message>
<xml_diff>
--- a/docs/NTCNA PCAP Decoder JSON Converter.pptx
+++ b/docs/NTCNA PCAP Decoder JSON Converter.pptx
@@ -280,7 +280,7 @@
           <a:p>
             <a:fld id="{B9D96AD3-49F6-43A9-865E-438AB34BF1F7}" type="datetimeFigureOut">
               <a:rPr lang="en-US" smtClean="0"/>
-              <a:t>7/15/2021</a:t>
+              <a:t>8/27/2024</a:t>
             </a:fld>
             <a:endParaRPr lang="en-US"/>
           </a:p>
@@ -478,7 +478,7 @@
           <a:p>
             <a:fld id="{B9D96AD3-49F6-43A9-865E-438AB34BF1F7}" type="datetimeFigureOut">
               <a:rPr lang="en-US" smtClean="0"/>
-              <a:t>7/15/2021</a:t>
+              <a:t>8/27/2024</a:t>
             </a:fld>
             <a:endParaRPr lang="en-US"/>
           </a:p>
@@ -686,7 +686,7 @@
           <a:p>
             <a:fld id="{B9D96AD3-49F6-43A9-865E-438AB34BF1F7}" type="datetimeFigureOut">
               <a:rPr lang="en-US" smtClean="0"/>
-              <a:t>7/15/2021</a:t>
+              <a:t>8/27/2024</a:t>
             </a:fld>
             <a:endParaRPr lang="en-US"/>
           </a:p>
@@ -884,7 +884,7 @@
           <a:p>
             <a:fld id="{B9D96AD3-49F6-43A9-865E-438AB34BF1F7}" type="datetimeFigureOut">
               <a:rPr lang="en-US" smtClean="0"/>
-              <a:t>7/15/2021</a:t>
+              <a:t>8/27/2024</a:t>
             </a:fld>
             <a:endParaRPr lang="en-US"/>
           </a:p>
@@ -1159,7 +1159,7 @@
           <a:p>
             <a:fld id="{B9D96AD3-49F6-43A9-865E-438AB34BF1F7}" type="datetimeFigureOut">
               <a:rPr lang="en-US" smtClean="0"/>
-              <a:t>7/15/2021</a:t>
+              <a:t>8/27/2024</a:t>
             </a:fld>
             <a:endParaRPr lang="en-US"/>
           </a:p>
@@ -1424,7 +1424,7 @@
           <a:p>
             <a:fld id="{B9D96AD3-49F6-43A9-865E-438AB34BF1F7}" type="datetimeFigureOut">
               <a:rPr lang="en-US" smtClean="0"/>
-              <a:t>7/15/2021</a:t>
+              <a:t>8/27/2024</a:t>
             </a:fld>
             <a:endParaRPr lang="en-US"/>
           </a:p>
@@ -1836,7 +1836,7 @@
           <a:p>
             <a:fld id="{B9D96AD3-49F6-43A9-865E-438AB34BF1F7}" type="datetimeFigureOut">
               <a:rPr lang="en-US" smtClean="0"/>
-              <a:t>7/15/2021</a:t>
+              <a:t>8/27/2024</a:t>
             </a:fld>
             <a:endParaRPr lang="en-US"/>
           </a:p>
@@ -1977,7 +1977,7 @@
           <a:p>
             <a:fld id="{B9D96AD3-49F6-43A9-865E-438AB34BF1F7}" type="datetimeFigureOut">
               <a:rPr lang="en-US" smtClean="0"/>
-              <a:t>7/15/2021</a:t>
+              <a:t>8/27/2024</a:t>
             </a:fld>
             <a:endParaRPr lang="en-US"/>
           </a:p>
@@ -2090,7 +2090,7 @@
           <a:p>
             <a:fld id="{B9D96AD3-49F6-43A9-865E-438AB34BF1F7}" type="datetimeFigureOut">
               <a:rPr lang="en-US" smtClean="0"/>
-              <a:t>7/15/2021</a:t>
+              <a:t>8/27/2024</a:t>
             </a:fld>
             <a:endParaRPr lang="en-US"/>
           </a:p>
@@ -2401,7 +2401,7 @@
           <a:p>
             <a:fld id="{B9D96AD3-49F6-43A9-865E-438AB34BF1F7}" type="datetimeFigureOut">
               <a:rPr lang="en-US" smtClean="0"/>
-              <a:t>7/15/2021</a:t>
+              <a:t>8/27/2024</a:t>
             </a:fld>
             <a:endParaRPr lang="en-US"/>
           </a:p>
@@ -2689,7 +2689,7 @@
           <a:p>
             <a:fld id="{B9D96AD3-49F6-43A9-865E-438AB34BF1F7}" type="datetimeFigureOut">
               <a:rPr lang="en-US" smtClean="0"/>
-              <a:t>7/15/2021</a:t>
+              <a:t>8/27/2024</a:t>
             </a:fld>
             <a:endParaRPr lang="en-US"/>
           </a:p>
@@ -2930,7 +2930,7 @@
           <a:p>
             <a:fld id="{B9D96AD3-49F6-43A9-865E-438AB34BF1F7}" type="datetimeFigureOut">
               <a:rPr lang="en-US" smtClean="0"/>
-              <a:t>7/15/2021</a:t>
+              <a:t>8/27/2024</a:t>
             </a:fld>
             <a:endParaRPr lang="en-US"/>
           </a:p>
@@ -3370,7 +3370,7 @@
           <a:p>
             <a:r>
               <a:rPr lang="en-US" dirty="0"/>
-              <a:t>NTCNA PCAP Decoder JSON Converter V1.1.11</a:t>
+              <a:t>NTCNA PCAP Decoder JSON Converter V2.0</a:t>
             </a:r>
           </a:p>
         </p:txBody>
@@ -3399,6 +3399,12 @@
             <a:r>
               <a:rPr lang="en-US" dirty="0"/>
               <a:t>Python application to convert PCAP data to JSON format</a:t>
+            </a:r>
+          </a:p>
+          <a:p>
+            <a:r>
+              <a:rPr lang="en-US" dirty="0"/>
+              <a:t>Now provided in standalone executables for Windows</a:t>
             </a:r>
           </a:p>
         </p:txBody>
@@ -4741,18 +4747,14 @@
             <a:pPr lvl="1"/>
             <a:r>
               <a:rPr lang="en-US" dirty="0"/>
-              <a:t>Python 3.8 or greater (Python 2 is EOL)</a:t>
+              <a:t>Python 3.11 or greater (Python 2 is EOL)</a:t>
             </a:r>
           </a:p>
           <a:p>
             <a:pPr lvl="1"/>
             <a:r>
-              <a:rPr lang="en-US" dirty="0" err="1"/>
-              <a:t>PySide</a:t>
-            </a:r>
-            <a:r>
-              <a:rPr lang="en-US" dirty="0"/>
-              <a:t> 2 or higher for QT5 based GUI</a:t>
+              <a:rPr lang="en-US" dirty="0"/>
+              <a:t>PySide6 or higher for QT6 based GUI (multiplatform)</a:t>
             </a:r>
           </a:p>
           <a:p>
@@ -4781,7 +4783,7 @@
                 <a:latin typeface="Courier New" panose="02070309020205020404" pitchFamily="49" charset="0"/>
                 <a:cs typeface="Courier New" panose="02070309020205020404" pitchFamily="49" charset="0"/>
               </a:rPr>
-              <a:t>pyside2-uic </a:t>
+              <a:t>pyside6-uic </a:t>
             </a:r>
             <a:r>
               <a:rPr lang="en-US" dirty="0" err="1">
@@ -4820,7 +4822,7 @@
             </a:r>
             <a:r>
               <a:rPr lang="en-US" dirty="0"/>
-              <a:t> 2.4.4 (</a:t>
+              <a:t> (</a:t>
             </a:r>
             <a:r>
               <a:rPr lang="en-US" dirty="0">
@@ -4832,51 +4834,9 @@
               <a:rPr lang="en-US" dirty="0"/>
               <a:t>)</a:t>
             </a:r>
-          </a:p>
-          <a:p>
-            <a:pPr lvl="1"/>
-            <a:r>
-              <a:rPr lang="en-US" dirty="0" err="1"/>
-              <a:t>Scapy</a:t>
-            </a:r>
-            <a:r>
-              <a:rPr lang="en-US" dirty="0"/>
-              <a:t> 2.4.5 crashes the application for some reason</a:t>
-            </a:r>
-          </a:p>
-          <a:p>
-            <a:pPr lvl="2"/>
-            <a:r>
-              <a:rPr lang="en-US" dirty="0"/>
-              <a:t>Do </a:t>
-            </a:r>
-            <a:r>
-              <a:rPr lang="en-US" dirty="0">
-                <a:latin typeface="Courier New" panose="02070309020205020404" pitchFamily="49" charset="0"/>
-                <a:cs typeface="Courier New" panose="02070309020205020404" pitchFamily="49" charset="0"/>
-              </a:rPr>
-              <a:t>pip3 install </a:t>
-            </a:r>
-            <a:r>
-              <a:rPr lang="en-US" dirty="0" err="1">
-                <a:latin typeface="Courier New" panose="02070309020205020404" pitchFamily="49" charset="0"/>
-                <a:cs typeface="Courier New" panose="02070309020205020404" pitchFamily="49" charset="0"/>
-              </a:rPr>
-              <a:t>scapy</a:t>
-            </a:r>
-            <a:r>
-              <a:rPr lang="en-US" dirty="0">
-                <a:latin typeface="Courier New" panose="02070309020205020404" pitchFamily="49" charset="0"/>
-                <a:cs typeface="Courier New" panose="02070309020205020404" pitchFamily="49" charset="0"/>
-              </a:rPr>
-              <a:t>==2.4.4</a:t>
-            </a:r>
-            <a:r>
-              <a:rPr lang="en-US" dirty="0">
-                <a:cs typeface="Courier New" panose="02070309020205020404" pitchFamily="49" charset="0"/>
-              </a:rPr>
-              <a:t> to downgrade</a:t>
-            </a:r>
+            <a:endParaRPr lang="en-US" dirty="0">
+              <a:cs typeface="Courier New" panose="02070309020205020404" pitchFamily="49" charset="0"/>
+            </a:endParaRPr>
           </a:p>
           <a:p>
             <a:r>
@@ -4916,8 +4876,19 @@
                 <a:latin typeface="Courier New" panose="02070309020205020404" pitchFamily="49" charset="0"/>
                 <a:cs typeface="Courier New" panose="02070309020205020404" pitchFamily="49" charset="0"/>
               </a:rPr>
-              <a:t>python3 setup.py install</a:t>
-            </a:r>
+              <a:t>python –m pip install </a:t>
+            </a:r>
+            <a:r>
+              <a:rPr lang="en-US" dirty="0" err="1">
+                <a:latin typeface="Courier New" panose="02070309020205020404" pitchFamily="49" charset="0"/>
+                <a:cs typeface="Courier New" panose="02070309020205020404" pitchFamily="49" charset="0"/>
+              </a:rPr>
+              <a:t>pycrate</a:t>
+            </a:r>
+            <a:endParaRPr lang="en-US" dirty="0">
+              <a:latin typeface="Courier New" panose="02070309020205020404" pitchFamily="49" charset="0"/>
+              <a:cs typeface="Courier New" panose="02070309020205020404" pitchFamily="49" charset="0"/>
+            </a:endParaRPr>
           </a:p>
           <a:p>
             <a:pPr lvl="1"/>
@@ -4938,15 +4909,7 @@
             <a:pPr lvl="1"/>
             <a:r>
               <a:rPr lang="en-US" dirty="0"/>
-              <a:t>Using </a:t>
-            </a:r>
-            <a:r>
-              <a:rPr lang="en-US" dirty="0" err="1"/>
-              <a:t>Pycrate</a:t>
-            </a:r>
-            <a:r>
-              <a:rPr lang="en-US" dirty="0"/>
-              <a:t> to decode 1609.2 has issues, manually decoded</a:t>
+              <a:t>1609.2 ASN.1 OER is manually decoded</a:t>
             </a:r>
           </a:p>
         </p:txBody>
@@ -5019,7 +4982,7 @@
             </a:r>
             <a:r>
               <a:rPr lang="en-US" b="1" dirty="0"/>
-              <a:t> JSON Format for J2735</a:t>
+              <a:t>/CI/CTIC JSON Format for J2735</a:t>
             </a:r>
           </a:p>
         </p:txBody>
@@ -5306,6 +5269,13 @@
             <a:r>
               <a:rPr lang="en-US" dirty="0"/>
               <a:t>Anaconda</a:t>
+            </a:r>
+          </a:p>
+          <a:p>
+            <a:pPr lvl="1"/>
+            <a:r>
+              <a:rPr lang="en-US" dirty="0"/>
+              <a:t>Snowflake</a:t>
             </a:r>
           </a:p>
           <a:p>
@@ -6526,7 +6496,7 @@
 </file>
 
 <file path=ppt/slides/slide17.xml><?xml version="1.0" encoding="utf-8"?>
-<p:sld xmlns:a="http://schemas.openxmlformats.org/drawingml/2006/main" xmlns:r="http://schemas.openxmlformats.org/officeDocument/2006/relationships" xmlns:p="http://schemas.openxmlformats.org/presentationml/2006/main">
+<p:sld xmlns:a="http://schemas.openxmlformats.org/drawingml/2006/main" xmlns:r="http://schemas.openxmlformats.org/officeDocument/2006/relationships" xmlns:p="http://schemas.openxmlformats.org/presentationml/2006/main" show="0">
   <p:cSld>
     <p:spTree>
       <p:nvGrpSpPr>
@@ -6609,7 +6579,7 @@
 </file>
 
 <file path=ppt/slides/slide18.xml><?xml version="1.0" encoding="utf-8"?>
-<p:sld xmlns:a="http://schemas.openxmlformats.org/drawingml/2006/main" xmlns:r="http://schemas.openxmlformats.org/officeDocument/2006/relationships" xmlns:p="http://schemas.openxmlformats.org/presentationml/2006/main">
+<p:sld xmlns:a="http://schemas.openxmlformats.org/drawingml/2006/main" xmlns:r="http://schemas.openxmlformats.org/officeDocument/2006/relationships" xmlns:p="http://schemas.openxmlformats.org/presentationml/2006/main" show="0">
   <p:cSld>
     <p:spTree>
       <p:nvGrpSpPr>
@@ -6755,7 +6725,7 @@
 </file>
 
 <file path=ppt/slides/slide19.xml><?xml version="1.0" encoding="utf-8"?>
-<p:sld xmlns:a="http://schemas.openxmlformats.org/drawingml/2006/main" xmlns:r="http://schemas.openxmlformats.org/officeDocument/2006/relationships" xmlns:p="http://schemas.openxmlformats.org/presentationml/2006/main">
+<p:sld xmlns:a="http://schemas.openxmlformats.org/drawingml/2006/main" xmlns:r="http://schemas.openxmlformats.org/officeDocument/2006/relationships" xmlns:p="http://schemas.openxmlformats.org/presentationml/2006/main" show="0">
   <p:cSld>
     <p:spTree>
       <p:nvGrpSpPr>
@@ -6933,10 +6903,10 @@
       </p:sp>
       <p:pic>
         <p:nvPicPr>
-          <p:cNvPr id="5" name="Picture 4">
-            <a:extLst>
-              <a:ext uri="{FF2B5EF4-FFF2-40B4-BE49-F238E27FC236}">
-                <a16:creationId xmlns:a16="http://schemas.microsoft.com/office/drawing/2014/main" id="{27D1FBF1-C859-4135-B6D4-7575F110B951}"/>
+          <p:cNvPr id="4" name="Picture 3" descr="A screenshot of a computer&#10;&#10;Description automatically generated">
+            <a:extLst>
+              <a:ext uri="{FF2B5EF4-FFF2-40B4-BE49-F238E27FC236}">
+                <a16:creationId xmlns:a16="http://schemas.microsoft.com/office/drawing/2014/main" id="{0FACB9D9-9127-8E0A-1B25-4D1451209567}"/>
               </a:ext>
             </a:extLst>
           </p:cNvPr>
@@ -6959,8 +6929,8 @@
         </p:blipFill>
         <p:spPr>
           <a:xfrm>
-            <a:off x="2139244" y="1300848"/>
-            <a:ext cx="7913511" cy="5440680"/>
+            <a:off x="2077175" y="1027906"/>
+            <a:ext cx="7533333" cy="5419048"/>
           </a:xfrm>
           <a:prstGeom prst="rect">
             <a:avLst/>
@@ -6981,7 +6951,7 @@
 </file>
 
 <file path=ppt/slides/slide20.xml><?xml version="1.0" encoding="utf-8"?>
-<p:sld xmlns:a="http://schemas.openxmlformats.org/drawingml/2006/main" xmlns:r="http://schemas.openxmlformats.org/officeDocument/2006/relationships" xmlns:p="http://schemas.openxmlformats.org/presentationml/2006/main">
+<p:sld xmlns:a="http://schemas.openxmlformats.org/drawingml/2006/main" xmlns:r="http://schemas.openxmlformats.org/officeDocument/2006/relationships" xmlns:p="http://schemas.openxmlformats.org/presentationml/2006/main" show="0">
   <p:cSld>
     <p:spTree>
       <p:nvGrpSpPr>
@@ -7179,15 +7149,14 @@
                 <a:latin typeface="Courier New" panose="02070309020205020404" pitchFamily="49" charset="0"/>
                 <a:cs typeface="Courier New" panose="02070309020205020404" pitchFamily="49" charset="0"/>
               </a:rPr>
-              <a:t>git clone </a:t>
-            </a:r>
-            <a:r>
-              <a:rPr lang="en-US" sz="1600" dirty="0">
-                <a:latin typeface="Courier New" panose="02070309020205020404" pitchFamily="49" charset="0"/>
-                <a:cs typeface="Courier New" panose="02070309020205020404" pitchFamily="49" charset="0"/>
-                <a:hlinkClick r:id="rId2"/>
-              </a:rPr>
-              <a:t>https://github.com/P1sec/pycrate.git</a:t>
+              <a:t>Python –m pip install </a:t>
+            </a:r>
+            <a:r>
+              <a:rPr lang="en-US" sz="1600" dirty="0" err="1">
+                <a:latin typeface="Courier New" panose="02070309020205020404" pitchFamily="49" charset="0"/>
+                <a:cs typeface="Courier New" panose="02070309020205020404" pitchFamily="49" charset="0"/>
+              </a:rPr>
+              <a:t>pycrate</a:t>
             </a:r>
             <a:endParaRPr lang="en-US" sz="1600" dirty="0">
               <a:latin typeface="Courier New" panose="02070309020205020404" pitchFamily="49" charset="0"/>
@@ -7201,24 +7170,56 @@
                 <a:latin typeface="Courier New" panose="02070309020205020404" pitchFamily="49" charset="0"/>
                 <a:cs typeface="Courier New" panose="02070309020205020404" pitchFamily="49" charset="0"/>
               </a:rPr>
-              <a:t>cd </a:t>
-            </a:r>
-            <a:r>
-              <a:rPr lang="en-US" sz="1600" dirty="0" err="1">
-                <a:latin typeface="Courier New" panose="02070309020205020404" pitchFamily="49" charset="0"/>
-                <a:cs typeface="Courier New" panose="02070309020205020404" pitchFamily="49" charset="0"/>
-              </a:rPr>
-              <a:t>pycrate</a:t>
-            </a:r>
-            <a:endParaRPr lang="en-US" sz="1600" dirty="0">
+              <a:t>Old method:</a:t>
+            </a:r>
+          </a:p>
+          <a:p>
+            <a:pPr lvl="2"/>
+            <a:r>
+              <a:rPr lang="en-US" sz="1200" dirty="0">
+                <a:latin typeface="Courier New" panose="02070309020205020404" pitchFamily="49" charset="0"/>
+                <a:cs typeface="Courier New" panose="02070309020205020404" pitchFamily="49" charset="0"/>
+              </a:rPr>
+              <a:t>git clone </a:t>
+            </a:r>
+            <a:r>
+              <a:rPr lang="en-US" sz="1200" dirty="0">
+                <a:latin typeface="Courier New" panose="02070309020205020404" pitchFamily="49" charset="0"/>
+                <a:cs typeface="Courier New" panose="02070309020205020404" pitchFamily="49" charset="0"/>
+                <a:hlinkClick r:id="rId2"/>
+              </a:rPr>
+              <a:t>https://github.com/P1sec/pycrate.git</a:t>
+            </a:r>
+            <a:endParaRPr lang="en-US" sz="1200" dirty="0">
               <a:latin typeface="Courier New" panose="02070309020205020404" pitchFamily="49" charset="0"/>
               <a:cs typeface="Courier New" panose="02070309020205020404" pitchFamily="49" charset="0"/>
             </a:endParaRPr>
           </a:p>
           <a:p>
-            <a:pPr lvl="1"/>
-            <a:r>
-              <a:rPr lang="en-US" sz="1600" dirty="0">
+            <a:pPr lvl="2"/>
+            <a:r>
+              <a:rPr lang="en-US" sz="1200" dirty="0">
+                <a:latin typeface="Courier New" panose="02070309020205020404" pitchFamily="49" charset="0"/>
+                <a:cs typeface="Courier New" panose="02070309020205020404" pitchFamily="49" charset="0"/>
+              </a:rPr>
+              <a:t>cd </a:t>
+            </a:r>
+            <a:r>
+              <a:rPr lang="en-US" sz="1200" dirty="0" err="1">
+                <a:latin typeface="Courier New" panose="02070309020205020404" pitchFamily="49" charset="0"/>
+                <a:cs typeface="Courier New" panose="02070309020205020404" pitchFamily="49" charset="0"/>
+              </a:rPr>
+              <a:t>pycrate</a:t>
+            </a:r>
+            <a:endParaRPr lang="en-US" sz="1200" dirty="0">
+              <a:latin typeface="Courier New" panose="02070309020205020404" pitchFamily="49" charset="0"/>
+              <a:cs typeface="Courier New" panose="02070309020205020404" pitchFamily="49" charset="0"/>
+            </a:endParaRPr>
+          </a:p>
+          <a:p>
+            <a:pPr lvl="2"/>
+            <a:r>
+              <a:rPr lang="en-US" sz="1200" dirty="0">
                 <a:latin typeface="Courier New" panose="02070309020205020404" pitchFamily="49" charset="0"/>
                 <a:cs typeface="Courier New" panose="02070309020205020404" pitchFamily="49" charset="0"/>
               </a:rPr>
@@ -7425,7 +7426,7 @@
               <a:rPr lang="en-US" dirty="0">
                 <a:hlinkClick r:id="rId2"/>
               </a:rPr>
-              <a:t>https://github.com/nprobert/Wireshark-DSRC</a:t>
+              <a:t>https://github.com/nprobert/Wireshark-J2735</a:t>
             </a:r>
             <a:endParaRPr lang="en-US" dirty="0"/>
           </a:p>
@@ -7523,7 +7524,7 @@
         </p:spPr>
         <p:txBody>
           <a:bodyPr>
-            <a:normAutofit fontScale="85000" lnSpcReduction="20000"/>
+            <a:normAutofit fontScale="77500" lnSpcReduction="20000"/>
           </a:bodyPr>
           <a:lstStyle/>
           <a:p>
@@ -7599,14 +7600,14 @@
             </a:r>
             <a:r>
               <a:rPr lang="en-US" dirty="0"/>
-              <a:t>, Wistron formats</a:t>
+              <a:t>, Wistron OBU formats</a:t>
             </a:r>
           </a:p>
           <a:p>
             <a:pPr lvl="2"/>
             <a:r>
               <a:rPr lang="en-US" dirty="0"/>
-              <a:t>Linux cooked, </a:t>
+              <a:t>0x88DC special, Linux cooked, </a:t>
             </a:r>
             <a:r>
               <a:rPr lang="en-US" dirty="0" err="1"/>
@@ -7623,6 +7624,13 @@
             <a:r>
               <a:rPr lang="en-US" dirty="0"/>
               <a:t> formats supported</a:t>
+            </a:r>
+          </a:p>
+          <a:p>
+            <a:pPr lvl="2"/>
+            <a:r>
+              <a:rPr lang="en-US" dirty="0"/>
+              <a:t>RSU TSCBM and IFM formats (CI and CTIC projects)</a:t>
             </a:r>
           </a:p>
           <a:p>
@@ -7847,7 +7855,7 @@
             <a:pPr lvl="1"/>
             <a:r>
               <a:rPr lang="en-US" dirty="0"/>
-              <a:t>Extracts J2735 UPER encoded MAPs to binary files</a:t>
+              <a:t>Extracts J2735 UPER encoded MAPs to binary files (.bin)</a:t>
             </a:r>
           </a:p>
           <a:p>
@@ -8044,99 +8052,265 @@
           </a:xfrm>
         </p:spPr>
         <p:txBody>
-          <a:bodyPr/>
+          <a:bodyPr>
+            <a:normAutofit/>
+          </a:bodyPr>
           <a:lstStyle/>
           <a:p>
             <a:r>
-              <a:rPr lang="en-US" dirty="0"/>
+              <a:rPr lang="en-US" sz="2000" dirty="0"/>
               <a:t>For the convenience of mass converting files</a:t>
             </a:r>
           </a:p>
           <a:p>
             <a:r>
-              <a:rPr lang="en-US" dirty="0"/>
+              <a:rPr lang="en-US" sz="2000" dirty="0"/>
+              <a:t>Output files into log output directory</a:t>
+            </a:r>
+          </a:p>
+          <a:p>
+            <a:r>
+              <a:rPr lang="en-US" sz="2000" dirty="0"/>
               <a:t>./j2735_decoder.py [options] &lt;files&gt;</a:t>
             </a:r>
           </a:p>
           <a:p>
-            <a:pPr lvl="1"/>
-            <a:r>
-              <a:rPr lang="en-US" dirty="0"/>
-              <a:t>-b	Split BSMs into files based on ID</a:t>
-            </a:r>
-          </a:p>
-          <a:p>
-            <a:pPr lvl="1"/>
-            <a:r>
-              <a:rPr lang="en-US" dirty="0"/>
-              <a:t>-c 	Convert BSMs (requires –b option)</a:t>
-            </a:r>
-          </a:p>
-          <a:p>
-            <a:pPr lvl="1"/>
-            <a:r>
-              <a:rPr lang="en-US" dirty="0"/>
-              <a:t>-d	Debug output</a:t>
-            </a:r>
-          </a:p>
-          <a:p>
-            <a:pPr lvl="1"/>
-            <a:r>
-              <a:rPr lang="en-US" dirty="0"/>
-              <a:t>-m	Binary Maps</a:t>
-            </a:r>
-          </a:p>
-          <a:p>
-            <a:pPr lvl="1"/>
-            <a:r>
-              <a:rPr lang="en-US" dirty="0"/>
-              <a:t>-s		Split MAP and SPAT into file based on ID</a:t>
-            </a:r>
-          </a:p>
-          <a:p>
-            <a:pPr lvl="1"/>
-            <a:r>
-              <a:rPr lang="en-US" dirty="0"/>
-              <a:t>-s		2</a:t>
-            </a:r>
-            <a:r>
-              <a:rPr lang="en-US" baseline="30000" dirty="0"/>
-              <a:t>nd</a:t>
-            </a:r>
-            <a:r>
-              <a:rPr lang="en-US" dirty="0"/>
-              <a:t> –s option separates MAPs from SPATs into files based on ID</a:t>
-            </a:r>
-          </a:p>
-          <a:p>
-            <a:pPr lvl="1"/>
-            <a:r>
-              <a:rPr lang="en-US" dirty="0"/>
-              <a:t>-u	Alternate UDP port</a:t>
-            </a:r>
-          </a:p>
-          <a:p>
-            <a:pPr lvl="1"/>
-            <a:r>
-              <a:rPr lang="en-US" dirty="0"/>
-              <a:t>-O &lt;</a:t>
-            </a:r>
-            <a:r>
-              <a:rPr lang="en-US" dirty="0" err="1"/>
-              <a:t>dir</a:t>
-            </a:r>
-            <a:r>
-              <a:rPr lang="en-US" dirty="0"/>
-              <a:t>&gt;	Alternate log output directory (default “logs”)</a:t>
-            </a:r>
-          </a:p>
-          <a:p>
-            <a:r>
-              <a:rPr lang="en-US" dirty="0"/>
-              <a:t>Will drop output files into log output directory subdirectory</a:t>
-            </a:r>
-          </a:p>
-          <a:p>
+            <a:pPr marL="0" indent="0">
+              <a:buNone/>
+            </a:pPr>
+            <a:r>
+              <a:rPr lang="en-US" sz="1800" dirty="0">
+                <a:solidFill>
+                  <a:srgbClr val="000000"/>
+                </a:solidFill>
+                <a:effectLst/>
+                <a:latin typeface="Courier New" panose="02070309020205020404" pitchFamily="49" charset="0"/>
+                <a:ea typeface="Times New Roman" panose="02020603050405020304" pitchFamily="18" charset="0"/>
+              </a:rPr>
+              <a:t>Python3 J2735-2024-05-28 PCAP Decoder V2.0.4 </a:t>
+            </a:r>
+            <a:br>
+              <a:rPr lang="en-US" sz="1800" dirty="0">
+                <a:effectLst/>
+                <a:latin typeface="Courier New" panose="02070309020205020404" pitchFamily="49" charset="0"/>
+                <a:ea typeface="Times New Roman" panose="02020603050405020304" pitchFamily="18" charset="0"/>
+              </a:rPr>
+            </a:br>
+            <a:r>
+              <a:rPr lang="en-US" sz="1800" dirty="0">
+                <a:effectLst/>
+                <a:latin typeface="Courier New" panose="02070309020205020404" pitchFamily="49" charset="0"/>
+                <a:ea typeface="Times New Roman" panose="02020603050405020304" pitchFamily="18" charset="0"/>
+              </a:rPr>
+              <a:t>j2735_decoder.py </a:t>
+            </a:r>
+            <a:r>
+              <a:rPr lang="en-US" sz="1800" u="sng" dirty="0" err="1">
+                <a:solidFill>
+                  <a:srgbClr val="0000FF"/>
+                </a:solidFill>
+                <a:effectLst/>
+                <a:latin typeface="Courier New" panose="02070309020205020404" pitchFamily="49" charset="0"/>
+                <a:ea typeface="Times New Roman" panose="02020603050405020304" pitchFamily="18" charset="0"/>
+                <a:hlinkClick r:id="rId2"/>
+              </a:rPr>
+              <a:t>bcdhmo:su:v:BO</a:t>
+            </a:r>
+            <a:r>
+              <a:rPr lang="en-US" sz="1800" dirty="0">
+                <a:effectLst/>
+                <a:latin typeface="Courier New" panose="02070309020205020404" pitchFamily="49" charset="0"/>
+                <a:ea typeface="Times New Roman" panose="02020603050405020304" pitchFamily="18" charset="0"/>
+              </a:rPr>
+              <a:t>: &lt;input PCAP files&gt; </a:t>
+            </a:r>
+            <a:br>
+              <a:rPr lang="en-US" sz="1800" dirty="0">
+                <a:effectLst/>
+                <a:latin typeface="Courier New" panose="02070309020205020404" pitchFamily="49" charset="0"/>
+                <a:ea typeface="Times New Roman" panose="02020603050405020304" pitchFamily="18" charset="0"/>
+              </a:rPr>
+            </a:br>
+            <a:r>
+              <a:rPr lang="en-US" sz="1800" dirty="0">
+                <a:effectLst/>
+                <a:latin typeface="Courier New" panose="02070309020205020404" pitchFamily="49" charset="0"/>
+                <a:ea typeface="Times New Roman" panose="02020603050405020304" pitchFamily="18" charset="0"/>
+              </a:rPr>
+              <a:t>       -b        Split BSMs to file by ID </a:t>
+            </a:r>
+            <a:br>
+              <a:rPr lang="en-US" sz="1800" dirty="0">
+                <a:effectLst/>
+                <a:latin typeface="Courier New" panose="02070309020205020404" pitchFamily="49" charset="0"/>
+                <a:ea typeface="Times New Roman" panose="02020603050405020304" pitchFamily="18" charset="0"/>
+              </a:rPr>
+            </a:br>
+            <a:r>
+              <a:rPr lang="en-US" sz="1800" dirty="0">
+                <a:effectLst/>
+                <a:latin typeface="Courier New" panose="02070309020205020404" pitchFamily="49" charset="0"/>
+                <a:ea typeface="Times New Roman" panose="02020603050405020304" pitchFamily="18" charset="0"/>
+              </a:rPr>
+              <a:t>       -c        Converting BSM enabled </a:t>
+            </a:r>
+            <a:br>
+              <a:rPr lang="en-US" sz="1800" dirty="0">
+                <a:effectLst/>
+                <a:latin typeface="Courier New" panose="02070309020205020404" pitchFamily="49" charset="0"/>
+                <a:ea typeface="Times New Roman" panose="02020603050405020304" pitchFamily="18" charset="0"/>
+              </a:rPr>
+            </a:br>
+            <a:r>
+              <a:rPr lang="en-US" sz="1800" dirty="0">
+                <a:effectLst/>
+                <a:latin typeface="Courier New" panose="02070309020205020404" pitchFamily="49" charset="0"/>
+                <a:ea typeface="Times New Roman" panose="02020603050405020304" pitchFamily="18" charset="0"/>
+              </a:rPr>
+              <a:t>       -d        Debugging enabled to debug.txt </a:t>
+            </a:r>
+            <a:br>
+              <a:rPr lang="en-US" sz="1800" dirty="0">
+                <a:effectLst/>
+                <a:latin typeface="Courier New" panose="02070309020205020404" pitchFamily="49" charset="0"/>
+                <a:ea typeface="Times New Roman" panose="02020603050405020304" pitchFamily="18" charset="0"/>
+              </a:rPr>
+            </a:br>
+            <a:r>
+              <a:rPr lang="en-US" sz="1800" dirty="0">
+                <a:effectLst/>
+                <a:latin typeface="Courier New" panose="02070309020205020404" pitchFamily="49" charset="0"/>
+                <a:ea typeface="Times New Roman" panose="02020603050405020304" pitchFamily="18" charset="0"/>
+              </a:rPr>
+              <a:t>       -h        Help </a:t>
+            </a:r>
+            <a:br>
+              <a:rPr lang="en-US" sz="1800" dirty="0">
+                <a:effectLst/>
+                <a:latin typeface="Courier New" panose="02070309020205020404" pitchFamily="49" charset="0"/>
+                <a:ea typeface="Times New Roman" panose="02020603050405020304" pitchFamily="18" charset="0"/>
+              </a:rPr>
+            </a:br>
+            <a:r>
+              <a:rPr lang="en-US" sz="1800" dirty="0">
+                <a:effectLst/>
+                <a:latin typeface="Courier New" panose="02070309020205020404" pitchFamily="49" charset="0"/>
+                <a:ea typeface="Times New Roman" panose="02020603050405020304" pitchFamily="18" charset="0"/>
+              </a:rPr>
+              <a:t>       -m        Binary MAP output in J2735 UPER format </a:t>
+            </a:r>
+            <a:br>
+              <a:rPr lang="en-US" sz="1800" dirty="0">
+                <a:effectLst/>
+                <a:latin typeface="Courier New" panose="02070309020205020404" pitchFamily="49" charset="0"/>
+                <a:ea typeface="Times New Roman" panose="02020603050405020304" pitchFamily="18" charset="0"/>
+              </a:rPr>
+            </a:br>
+            <a:r>
+              <a:rPr lang="en-US" sz="1800" dirty="0">
+                <a:effectLst/>
+                <a:latin typeface="Courier New" panose="02070309020205020404" pitchFamily="49" charset="0"/>
+                <a:ea typeface="Times New Roman" panose="02020603050405020304" pitchFamily="18" charset="0"/>
+              </a:rPr>
+              <a:t>       -o &lt;offs&gt; UDP offset to data in bytes </a:t>
+            </a:r>
+            <a:br>
+              <a:rPr lang="en-US" sz="1800" dirty="0">
+                <a:effectLst/>
+                <a:latin typeface="Courier New" panose="02070309020205020404" pitchFamily="49" charset="0"/>
+                <a:ea typeface="Times New Roman" panose="02020603050405020304" pitchFamily="18" charset="0"/>
+              </a:rPr>
+            </a:br>
+            <a:r>
+              <a:rPr lang="en-US" sz="1800" dirty="0">
+                <a:effectLst/>
+                <a:latin typeface="Courier New" panose="02070309020205020404" pitchFamily="49" charset="0"/>
+                <a:ea typeface="Times New Roman" panose="02020603050405020304" pitchFamily="18" charset="0"/>
+              </a:rPr>
+              <a:t>       -s        Split MAPs/SPATs to file by ID in JSON </a:t>
+            </a:r>
+            <a:br>
+              <a:rPr lang="en-US" sz="1800" dirty="0">
+                <a:effectLst/>
+                <a:latin typeface="Courier New" panose="02070309020205020404" pitchFamily="49" charset="0"/>
+                <a:ea typeface="Times New Roman" panose="02020603050405020304" pitchFamily="18" charset="0"/>
+              </a:rPr>
+            </a:br>
+            <a:r>
+              <a:rPr lang="en-US" sz="1800" dirty="0">
+                <a:effectLst/>
+                <a:latin typeface="Courier New" panose="02070309020205020404" pitchFamily="49" charset="0"/>
+                <a:ea typeface="Times New Roman" panose="02020603050405020304" pitchFamily="18" charset="0"/>
+              </a:rPr>
+              <a:t>       -u &lt;port&gt; UDP port </a:t>
+            </a:r>
+            <a:br>
+              <a:rPr lang="en-US" sz="1800" dirty="0">
+                <a:effectLst/>
+                <a:latin typeface="Courier New" panose="02070309020205020404" pitchFamily="49" charset="0"/>
+                <a:ea typeface="Times New Roman" panose="02020603050405020304" pitchFamily="18" charset="0"/>
+              </a:rPr>
+            </a:br>
+            <a:r>
+              <a:rPr lang="en-US" sz="1800" dirty="0">
+                <a:effectLst/>
+                <a:latin typeface="Courier New" panose="02070309020205020404" pitchFamily="49" charset="0"/>
+                <a:ea typeface="Times New Roman" panose="02020603050405020304" pitchFamily="18" charset="0"/>
+              </a:rPr>
+              <a:t>       -v vid    BSMs extracted by vehicle id </a:t>
+            </a:r>
+            <a:br>
+              <a:rPr lang="en-US" sz="1800" dirty="0">
+                <a:effectLst/>
+                <a:latin typeface="Courier New" panose="02070309020205020404" pitchFamily="49" charset="0"/>
+                <a:ea typeface="Times New Roman" panose="02020603050405020304" pitchFamily="18" charset="0"/>
+              </a:rPr>
+            </a:br>
+            <a:r>
+              <a:rPr lang="en-US" sz="1800" dirty="0">
+                <a:effectLst/>
+                <a:latin typeface="Courier New" panose="02070309020205020404" pitchFamily="49" charset="0"/>
+                <a:ea typeface="Times New Roman" panose="02020603050405020304" pitchFamily="18" charset="0"/>
+              </a:rPr>
+              <a:t>       -B        Use PCAP file base name as base path to output directory </a:t>
+            </a:r>
+            <a:br>
+              <a:rPr lang="en-US" sz="1800" dirty="0">
+                <a:effectLst/>
+                <a:latin typeface="Courier New" panose="02070309020205020404" pitchFamily="49" charset="0"/>
+                <a:ea typeface="Times New Roman" panose="02020603050405020304" pitchFamily="18" charset="0"/>
+              </a:rPr>
+            </a:br>
+            <a:r>
+              <a:rPr lang="en-US" sz="1800" dirty="0">
+                <a:effectLst/>
+                <a:latin typeface="Courier New" panose="02070309020205020404" pitchFamily="49" charset="0"/>
+                <a:ea typeface="Times New Roman" panose="02020603050405020304" pitchFamily="18" charset="0"/>
+              </a:rPr>
+              <a:t>       -O &lt;path&gt; Path to output base directory </a:t>
+            </a:r>
+            <a:br>
+              <a:rPr lang="en-US" sz="1800" dirty="0">
+                <a:effectLst/>
+                <a:latin typeface="Courier New" panose="02070309020205020404" pitchFamily="49" charset="0"/>
+                <a:ea typeface="Times New Roman" panose="02020603050405020304" pitchFamily="18" charset="0"/>
+              </a:rPr>
+            </a:br>
+            <a:r>
+              <a:rPr lang="en-US" sz="1800" dirty="0">
+                <a:effectLst/>
+                <a:latin typeface="Courier New" panose="02070309020205020404" pitchFamily="49" charset="0"/>
+                <a:ea typeface="Times New Roman" panose="02020603050405020304" pitchFamily="18" charset="0"/>
+              </a:rPr>
+              <a:t>        Creates JSON and KML (MAP) files with metadata.txt to &lt;path&gt;/&lt;base&gt;</a:t>
+            </a:r>
+            <a:br>
+              <a:rPr lang="en-US" sz="1800" dirty="0">
+                <a:effectLst/>
+                <a:latin typeface="Courier New" panose="02070309020205020404" pitchFamily="49" charset="0"/>
+                <a:ea typeface="Times New Roman" panose="02020603050405020304" pitchFamily="18" charset="0"/>
+              </a:rPr>
+            </a:br>
             <a:endParaRPr lang="en-US" dirty="0"/>
           </a:p>
         </p:txBody>
@@ -8335,7 +8509,7 @@
             <a:pPr lvl="1"/>
             <a:r>
               <a:rPr lang="en-US" dirty="0"/>
-              <a:t>Complicates our efforts</a:t>
+              <a:t>Complicates our efforts, but some vendors have agreed on special 0x88DC PCAP format</a:t>
             </a:r>
           </a:p>
           <a:p>
@@ -8412,7 +8586,7 @@
             <a:pPr lvl="1"/>
             <a:r>
               <a:rPr lang="en-US" dirty="0"/>
-              <a:t>Using ASN.1 tools</a:t>
+              <a:t>Using ASN.1 compiler tools (C/C++/Java/Rust?)</a:t>
             </a:r>
           </a:p>
           <a:p>
@@ -8426,13 +8600,16 @@
             <a:pPr lvl="1"/>
             <a:r>
               <a:rPr lang="en-US" dirty="0"/>
-              <a:t>Using Python </a:t>
+              <a:t>Using Python3 </a:t>
             </a:r>
             <a:r>
               <a:rPr lang="en-US" dirty="0" err="1"/>
               <a:t>Pycrate</a:t>
             </a:r>
-            <a:endParaRPr lang="en-US" dirty="0"/>
+            <a:r>
+              <a:rPr lang="en-US" dirty="0"/>
+              <a:t> module</a:t>
+            </a:r>
           </a:p>
           <a:p>
             <a:pPr lvl="2"/>
@@ -8445,7 +8622,7 @@
             <a:pPr lvl="1"/>
             <a:r>
               <a:rPr lang="en-US" dirty="0"/>
-              <a:t>Import JSON into big data science tools like Pandas and/or Anaconda</a:t>
+              <a:t>Import JSON into big data science tools like Pandas and/or Anaconda, even Snowflake</a:t>
             </a:r>
           </a:p>
         </p:txBody>
@@ -9611,14 +9788,28 @@
           </a:lstStyle>
           <a:p>
             <a:r>
-              <a:rPr lang="en-US" dirty="0"/>
-              <a:t>Not currently implemented in tools</a:t>
-            </a:r>
-          </a:p>
-          <a:p>
-            <a:r>
-              <a:rPr lang="en-US" dirty="0"/>
-              <a:t>Same rules as for DSRC</a:t>
+              <a:rPr lang="en-US" sz="2400" dirty="0"/>
+              <a:t>Some OBUs send over UDP (</a:t>
+            </a:r>
+            <a:r>
+              <a:rPr lang="en-US" sz="2400" dirty="0" err="1"/>
+              <a:t>Cohda</a:t>
+            </a:r>
+            <a:r>
+              <a:rPr lang="en-US" sz="2400" dirty="0"/>
+              <a:t> ports 9000-9001)</a:t>
+            </a:r>
+          </a:p>
+          <a:p>
+            <a:r>
+              <a:rPr lang="en-US" sz="2400" dirty="0"/>
+              <a:t>Or use special 0x88DC format for OTA data</a:t>
+            </a:r>
+          </a:p>
+          <a:p>
+            <a:r>
+              <a:rPr lang="en-US" sz="2400" dirty="0"/>
+              <a:t>Same rules as for DSRC, needs WSMP layer</a:t>
             </a:r>
           </a:p>
         </p:txBody>

</xml_diff>